<commit_message>
Final pdfs and final ppts
</commit_message>
<xml_diff>
--- a/spring23-team-1/deliverables/Deliverable 2.pptx
+++ b/spring23-team-1/deliverables/Deliverable 2.pptx
@@ -1236,7 +1236,7 @@
       </p:grpSpPr>
       <p:sp>
         <p:nvSpPr>
-          <p:cNvPr id="86" name="Google Shape;86;g221dc42583f_0_6:notes"/>
+          <p:cNvPr id="86" name="Google Shape;86;g1f9c0c1a19f_0_1677:notes"/>
           <p:cNvSpPr/>
           <p:nvPr>
             <p:ph idx="2" type="sldImg"/>
@@ -1271,7 +1271,7 @@
       </p:sp>
       <p:sp>
         <p:nvSpPr>
-          <p:cNvPr id="87" name="Google Shape;87;g221dc42583f_0_6:notes"/>
+          <p:cNvPr id="87" name="Google Shape;87;g1f9c0c1a19f_0_1677:notes"/>
           <p:cNvSpPr txBox="1"/>
           <p:nvPr>
             <p:ph idx="1" type="body"/>
@@ -1335,7 +1335,7 @@
       </p:grpSpPr>
       <p:sp>
         <p:nvSpPr>
-          <p:cNvPr id="92" name="Google Shape;92;g1f9c0c1a19f_0_1677:notes"/>
+          <p:cNvPr id="92" name="Google Shape;92;g221dc42583f_0_6:notes"/>
           <p:cNvSpPr/>
           <p:nvPr>
             <p:ph idx="2" type="sldImg"/>
@@ -1370,7 +1370,7 @@
       </p:sp>
       <p:sp>
         <p:nvSpPr>
-          <p:cNvPr id="93" name="Google Shape;93;g1f9c0c1a19f_0_1677:notes"/>
+          <p:cNvPr id="93" name="Google Shape;93;g221dc42583f_0_6:notes"/>
           <p:cNvSpPr txBox="1"/>
           <p:nvPr>
             <p:ph idx="1" type="body"/>
@@ -7715,6 +7715,55 @@
                 <a:spcPts val="1200"/>
               </a:spcBef>
               <a:spcAft>
+                <a:spcPts val="0"/>
+              </a:spcAft>
+              <a:buNone/>
+            </a:pPr>
+            <a:r>
+              <a:rPr lang="en"/>
+              <a:t>We have </a:t>
+            </a:r>
+            <a:r>
+              <a:rPr lang="en"/>
+              <a:t>created the pdfs for these dashboards which we presented during the meeting, which is under the </a:t>
+            </a:r>
+            <a:r>
+              <a:rPr lang="en" u="sng">
+                <a:solidFill>
+                  <a:schemeClr val="hlink"/>
+                </a:solidFill>
+                <a:hlinkClick r:id="rId3"/>
+              </a:rPr>
+              <a:t>link</a:t>
+            </a:r>
+            <a:r>
+              <a:rPr lang="en"/>
+              <a:t>.</a:t>
+            </a:r>
+            <a:endParaRPr/>
+          </a:p>
+          <a:p>
+            <a:pPr indent="0" lvl="0" marL="0" rtl="0" algn="l">
+              <a:spcBef>
+                <a:spcPts val="1200"/>
+              </a:spcBef>
+              <a:spcAft>
+                <a:spcPts val="0"/>
+              </a:spcAft>
+              <a:buNone/>
+            </a:pPr>
+            <a:r>
+              <a:rPr lang="en"/>
+              <a:t>PDF Name: IncomeAgeTrends.pdf</a:t>
+            </a:r>
+            <a:endParaRPr/>
+          </a:p>
+          <a:p>
+            <a:pPr indent="0" lvl="0" marL="0" rtl="0" algn="l">
+              <a:spcBef>
+                <a:spcPts val="1200"/>
+              </a:spcBef>
+              <a:spcAft>
                 <a:spcPts val="1200"/>
               </a:spcAft>
               <a:buNone/>
@@ -7864,6 +7913,82 @@
             </a:r>
             <a:endParaRPr/>
           </a:p>
+          <a:p>
+            <a:pPr indent="0" lvl="0" marL="0" rtl="0" algn="l">
+              <a:spcBef>
+                <a:spcPts val="1200"/>
+              </a:spcBef>
+              <a:spcAft>
+                <a:spcPts val="0"/>
+              </a:spcAft>
+              <a:buNone/>
+            </a:pPr>
+            <a:r>
+              <a:t/>
+            </a:r>
+            <a:endParaRPr/>
+          </a:p>
+          <a:p>
+            <a:pPr indent="0" lvl="0" marL="0" rtl="0" algn="l">
+              <a:spcBef>
+                <a:spcPts val="1200"/>
+              </a:spcBef>
+              <a:spcAft>
+                <a:spcPts val="0"/>
+              </a:spcAft>
+              <a:buClr>
+                <a:schemeClr val="dk2"/>
+              </a:buClr>
+              <a:buSzPts val="1100"/>
+              <a:buFont typeface="Arial"/>
+              <a:buNone/>
+            </a:pPr>
+            <a:r>
+              <a:rPr lang="en"/>
+              <a:t>We have created the pdfs for these dashboards which we presented during the meeting, which is under the </a:t>
+            </a:r>
+            <a:r>
+              <a:rPr lang="en" u="sng">
+                <a:solidFill>
+                  <a:schemeClr val="accent5"/>
+                </a:solidFill>
+                <a:hlinkClick r:id="rId3">
+                  <a:extLst>
+                    <a:ext uri="{A12FA001-AC4F-418D-AE19-62706E023703}">
+                      <ahyp:hlinkClr val="tx"/>
+                    </a:ext>
+                  </a:extLst>
+                </a:hlinkClick>
+              </a:rPr>
+              <a:t>link</a:t>
+            </a:r>
+            <a:r>
+              <a:rPr lang="en"/>
+              <a:t>.</a:t>
+            </a:r>
+            <a:endParaRPr/>
+          </a:p>
+          <a:p>
+            <a:pPr indent="0" lvl="0" marL="0" rtl="0" algn="l">
+              <a:spcBef>
+                <a:spcPts val="1200"/>
+              </a:spcBef>
+              <a:spcAft>
+                <a:spcPts val="1200"/>
+              </a:spcAft>
+              <a:buClr>
+                <a:schemeClr val="dk2"/>
+              </a:buClr>
+              <a:buSzPts val="1100"/>
+              <a:buFont typeface="Arial"/>
+              <a:buNone/>
+            </a:pPr>
+            <a:r>
+              <a:rPr lang="en"/>
+              <a:t>PDF Name: EconomicCrimeTrends.pdf</a:t>
+            </a:r>
+            <a:endParaRPr/>
+          </a:p>
         </p:txBody>
       </p:sp>
     </p:spTree>
@@ -7987,6 +8112,82 @@
             </a:r>
             <a:endParaRPr/>
           </a:p>
+          <a:p>
+            <a:pPr indent="0" lvl="0" marL="0" rtl="0" algn="l">
+              <a:spcBef>
+                <a:spcPts val="1200"/>
+              </a:spcBef>
+              <a:spcAft>
+                <a:spcPts val="0"/>
+              </a:spcAft>
+              <a:buNone/>
+            </a:pPr>
+            <a:r>
+              <a:t/>
+            </a:r>
+            <a:endParaRPr/>
+          </a:p>
+          <a:p>
+            <a:pPr indent="0" lvl="0" marL="0" rtl="0" algn="l">
+              <a:spcBef>
+                <a:spcPts val="1200"/>
+              </a:spcBef>
+              <a:spcAft>
+                <a:spcPts val="0"/>
+              </a:spcAft>
+              <a:buClr>
+                <a:schemeClr val="dk2"/>
+              </a:buClr>
+              <a:buSzPts val="1100"/>
+              <a:buFont typeface="Arial"/>
+              <a:buNone/>
+            </a:pPr>
+            <a:r>
+              <a:rPr lang="en"/>
+              <a:t>We have created the pdfs for these dashboards which we presented during the meeting, which is under the </a:t>
+            </a:r>
+            <a:r>
+              <a:rPr lang="en" u="sng">
+                <a:solidFill>
+                  <a:schemeClr val="accent5"/>
+                </a:solidFill>
+                <a:hlinkClick r:id="rId3">
+                  <a:extLst>
+                    <a:ext uri="{A12FA001-AC4F-418D-AE19-62706E023703}">
+                      <ahyp:hlinkClr val="tx"/>
+                    </a:ext>
+                  </a:extLst>
+                </a:hlinkClick>
+              </a:rPr>
+              <a:t>link</a:t>
+            </a:r>
+            <a:r>
+              <a:rPr lang="en"/>
+              <a:t>.</a:t>
+            </a:r>
+            <a:endParaRPr/>
+          </a:p>
+          <a:p>
+            <a:pPr indent="0" lvl="0" marL="0" rtl="0" algn="l">
+              <a:spcBef>
+                <a:spcPts val="1200"/>
+              </a:spcBef>
+              <a:spcAft>
+                <a:spcPts val="1200"/>
+              </a:spcAft>
+              <a:buClr>
+                <a:schemeClr val="dk2"/>
+              </a:buClr>
+              <a:buSzPts val="1100"/>
+              <a:buFont typeface="Arial"/>
+              <a:buNone/>
+            </a:pPr>
+            <a:r>
+              <a:rPr lang="en"/>
+              <a:t>PDF Name: AffordableHousingandGunCrime.pdf</a:t>
+            </a:r>
+            <a:endParaRPr/>
+          </a:p>
         </p:txBody>
       </p:sp>
     </p:spTree>
@@ -8024,8 +8225,8 @@
         </p:nvSpPr>
         <p:spPr>
           <a:xfrm>
-            <a:off x="423200" y="393750"/>
-            <a:ext cx="7913100" cy="534300"/>
+            <a:off x="311700" y="445025"/>
+            <a:ext cx="8520600" cy="572700"/>
           </a:xfrm>
           <a:prstGeom prst="rect">
             <a:avLst/>
@@ -8048,7 +8249,7 @@
             </a:pPr>
             <a:r>
               <a:rPr lang="en"/>
-              <a:t>Results and Observations</a:t>
+              <a:t>POVERTY and CRIME DATA VISUALIZATIONS</a:t>
             </a:r>
             <a:endParaRPr/>
           </a:p>
@@ -8064,8 +8265,8 @@
         </p:nvSpPr>
         <p:spPr>
           <a:xfrm>
-            <a:off x="423200" y="1094650"/>
-            <a:ext cx="7708200" cy="3115500"/>
+            <a:off x="311700" y="1234075"/>
+            <a:ext cx="8520600" cy="3334800"/>
           </a:xfrm>
           <a:prstGeom prst="rect">
             <a:avLst/>
@@ -8073,28 +8274,42 @@
         </p:spPr>
         <p:txBody>
           <a:bodyPr anchorCtr="0" anchor="t" bIns="91425" lIns="91425" spcFirstLastPara="1" rIns="91425" wrap="square" tIns="91425">
-            <a:normAutofit fontScale="77500" lnSpcReduction="20000"/>
+            <a:normAutofit lnSpcReduction="10000"/>
           </a:bodyPr>
           <a:lstStyle/>
           <a:p>
-            <a:pPr indent="0" lvl="0" marL="0" rtl="0" algn="l">
-              <a:spcBef>
-                <a:spcPts val="0"/>
-              </a:spcBef>
-              <a:spcAft>
-                <a:spcPts val="0"/>
-              </a:spcAft>
-              <a:buNone/>
+            <a:pPr indent="-342900" lvl="0" marL="457200" rtl="0" algn="l">
+              <a:spcBef>
+                <a:spcPts val="0"/>
+              </a:spcBef>
+              <a:spcAft>
+                <a:spcPts val="0"/>
+              </a:spcAft>
+              <a:buSzPts val="1800"/>
+              <a:buChar char="➔"/>
             </a:pPr>
             <a:r>
               <a:rPr lang="en"/>
-              <a:t>Datasets that Team 1 has explored are  </a:t>
-            </a:r>
-            <a:r>
-              <a:rPr b="1" lang="en"/>
-              <a:t>Age Trends, Crime dataset, Housing dataset,  Economic Well-being dataset,  Income dataset, Poverty dataset.</a:t>
-            </a:r>
-            <a:endParaRPr b="1"/>
+              <a:t>POVERTY TRENDS</a:t>
+            </a:r>
+            <a:endParaRPr/>
+          </a:p>
+          <a:p>
+            <a:pPr indent="-342900" lvl="0" marL="457200" rtl="0" algn="l">
+              <a:spcBef>
+                <a:spcPts val="0"/>
+              </a:spcBef>
+              <a:spcAft>
+                <a:spcPts val="0"/>
+              </a:spcAft>
+              <a:buSzPts val="1800"/>
+              <a:buChar char="➔"/>
+            </a:pPr>
+            <a:r>
+              <a:rPr lang="en"/>
+              <a:t>CRIME TRENDS</a:t>
+            </a:r>
+            <a:endParaRPr/>
           </a:p>
           <a:p>
             <a:pPr indent="0" lvl="0" marL="0" rtl="0" algn="l">
@@ -8107,10 +8322,9 @@
               <a:buNone/>
             </a:pPr>
             <a:r>
-              <a:rPr b="1" lang="en"/>
-              <a:t>We have tried to present and plot as many variables as possible to understand the story of South-west DC better.</a:t>
-            </a:r>
-            <a:endParaRPr b="1"/>
+              <a:t/>
+            </a:r>
+            <a:endParaRPr/>
           </a:p>
           <a:p>
             <a:pPr indent="0" lvl="0" marL="0" rtl="0" algn="l">
@@ -8120,134 +8334,86 @@
               <a:spcAft>
                 <a:spcPts val="0"/>
               </a:spcAft>
+              <a:buClr>
+                <a:schemeClr val="dk2"/>
+              </a:buClr>
+              <a:buSzPts val="1100"/>
+              <a:buFont typeface="Arial"/>
               <a:buNone/>
             </a:pPr>
             <a:r>
               <a:rPr lang="en"/>
-              <a:t>Some correlations we have found:</a:t>
+              <a:t>We have created the pdfs for these dashboards which we presented during the meeting, which is under the </a:t>
+            </a:r>
+            <a:r>
+              <a:rPr lang="en" u="sng">
+                <a:solidFill>
+                  <a:schemeClr val="accent5"/>
+                </a:solidFill>
+                <a:hlinkClick r:id="rId3">
+                  <a:extLst>
+                    <a:ext uri="{A12FA001-AC4F-418D-AE19-62706E023703}">
+                      <ahyp:hlinkClr val="tx"/>
+                    </a:ext>
+                  </a:extLst>
+                </a:hlinkClick>
+              </a:rPr>
+              <a:t>link</a:t>
+            </a:r>
+            <a:r>
+              <a:rPr lang="en"/>
+              <a:t>.</a:t>
             </a:r>
             <a:endParaRPr/>
           </a:p>
           <a:p>
-            <a:pPr indent="-317182" lvl="0" marL="457200" rtl="0" algn="l">
+            <a:pPr indent="0" lvl="0" marL="0" rtl="0" algn="l">
               <a:spcBef>
                 <a:spcPts val="1200"/>
               </a:spcBef>
               <a:spcAft>
                 <a:spcPts val="0"/>
               </a:spcAft>
-              <a:buSzPct val="100000"/>
-              <a:buChar char="-"/>
+              <a:buClr>
+                <a:schemeClr val="dk2"/>
+              </a:buClr>
+              <a:buSzPts val="1100"/>
+              <a:buFont typeface="Arial"/>
+              <a:buNone/>
             </a:pPr>
             <a:r>
               <a:rPr lang="en"/>
-              <a:t>Affordable</a:t>
-            </a:r>
-            <a:r>
-              <a:rPr lang="en"/>
-              <a:t> housing and gun related crime</a:t>
+              <a:t>PDF Name: PovertyCrimeTrends.pdf</a:t>
             </a:r>
             <a:endParaRPr/>
           </a:p>
           <a:p>
-            <a:pPr indent="-317182" lvl="0" marL="457200" rtl="0" algn="l">
-              <a:spcBef>
-                <a:spcPts val="0"/>
-              </a:spcBef>
-              <a:spcAft>
-                <a:spcPts val="0"/>
-              </a:spcAft>
-              <a:buSzPct val="100000"/>
-              <a:buChar char="-"/>
+            <a:pPr indent="0" lvl="0" marL="0" rtl="0" algn="l">
+              <a:spcBef>
+                <a:spcPts val="1200"/>
+              </a:spcBef>
+              <a:spcAft>
+                <a:spcPts val="0"/>
+              </a:spcAft>
+              <a:buNone/>
             </a:pPr>
             <a:r>
-              <a:rPr lang="en"/>
-              <a:t>Income and Ward location</a:t>
+              <a:t/>
             </a:r>
             <a:endParaRPr/>
           </a:p>
           <a:p>
-            <a:pPr indent="-317182" lvl="0" marL="457200" rtl="0" algn="l">
-              <a:spcBef>
-                <a:spcPts val="0"/>
-              </a:spcBef>
-              <a:spcAft>
-                <a:spcPts val="0"/>
-              </a:spcAft>
-              <a:buSzPct val="100000"/>
-              <a:buChar char="-"/>
+            <a:pPr indent="0" lvl="0" marL="0" rtl="0" algn="l">
+              <a:spcBef>
+                <a:spcPts val="1200"/>
+              </a:spcBef>
+              <a:spcAft>
+                <a:spcPts val="1200"/>
+              </a:spcAft>
+              <a:buNone/>
             </a:pPr>
             <a:r>
-              <a:rPr lang="en"/>
-              <a:t>Crime and Ward location</a:t>
-            </a:r>
-            <a:endParaRPr/>
-          </a:p>
-          <a:p>
-            <a:pPr indent="-317182" lvl="0" marL="457200" rtl="0" algn="l">
-              <a:spcBef>
-                <a:spcPts val="0"/>
-              </a:spcBef>
-              <a:spcAft>
-                <a:spcPts val="0"/>
-              </a:spcAft>
-              <a:buSzPct val="100000"/>
-              <a:buChar char="-"/>
-            </a:pPr>
-            <a:r>
-              <a:rPr lang="en"/>
-              <a:t>Median Income across Washington DC</a:t>
-            </a:r>
-            <a:endParaRPr/>
-          </a:p>
-          <a:p>
-            <a:pPr indent="-317182" lvl="0" marL="457200" rtl="0" algn="l">
-              <a:spcBef>
-                <a:spcPts val="0"/>
-              </a:spcBef>
-              <a:spcAft>
-                <a:spcPts val="0"/>
-              </a:spcAft>
-              <a:buSzPct val="100000"/>
-              <a:buChar char="-"/>
-            </a:pPr>
-            <a:r>
-              <a:rPr lang="en"/>
-              <a:t>Income amongst different ethnic groups </a:t>
-            </a:r>
-            <a:endParaRPr/>
-          </a:p>
-          <a:p>
-            <a:pPr indent="-317182" lvl="0" marL="457200" rtl="0" algn="l">
-              <a:spcBef>
-                <a:spcPts val="0"/>
-              </a:spcBef>
-              <a:spcAft>
-                <a:spcPts val="0"/>
-              </a:spcAft>
-              <a:buSzPct val="100000"/>
-              <a:buChar char="-"/>
-            </a:pPr>
-            <a:r>
-              <a:rPr lang="en"/>
-              <a:t>Poverty against various races</a:t>
-            </a:r>
-            <a:endParaRPr/>
-          </a:p>
-          <a:p>
-            <a:pPr indent="-317182" lvl="0" marL="457200" rtl="0" algn="l">
-              <a:spcBef>
-                <a:spcPts val="0"/>
-              </a:spcBef>
-              <a:spcAft>
-                <a:spcPts val="0"/>
-              </a:spcAft>
-              <a:buSzPct val="100000"/>
-              <a:buChar char="-"/>
-            </a:pPr>
-            <a:r>
-              <a:rPr lang="en"/>
-              <a:t>Kinds of Crime in different wards. </a:t>
+              <a:t/>
             </a:r>
             <a:endParaRPr/>
           </a:p>
@@ -8288,8 +8454,8 @@
         </p:nvSpPr>
         <p:spPr>
           <a:xfrm>
-            <a:off x="311700" y="445025"/>
-            <a:ext cx="8520600" cy="572700"/>
+            <a:off x="423200" y="393750"/>
+            <a:ext cx="7913100" cy="534300"/>
           </a:xfrm>
           <a:prstGeom prst="rect">
             <a:avLst/>
@@ -8312,7 +8478,7 @@
             </a:pPr>
             <a:r>
               <a:rPr lang="en"/>
-              <a:t>POVERTY and CRIME DATA VISUALIZATIONS</a:t>
+              <a:t>Results and Observations</a:t>
             </a:r>
             <a:endParaRPr/>
           </a:p>
@@ -8328,8 +8494,8 @@
         </p:nvSpPr>
         <p:spPr>
           <a:xfrm>
-            <a:off x="311700" y="1234075"/>
-            <a:ext cx="8520600" cy="3334800"/>
+            <a:off x="423200" y="1094650"/>
+            <a:ext cx="7708200" cy="3115500"/>
           </a:xfrm>
           <a:prstGeom prst="rect">
             <a:avLst/>
@@ -8337,85 +8503,181 @@
         </p:spPr>
         <p:txBody>
           <a:bodyPr anchorCtr="0" anchor="t" bIns="91425" lIns="91425" spcFirstLastPara="1" rIns="91425" wrap="square" tIns="91425">
-            <a:normAutofit/>
+            <a:normAutofit fontScale="77500" lnSpcReduction="20000"/>
           </a:bodyPr>
           <a:lstStyle/>
           <a:p>
-            <a:pPr indent="-342900" lvl="0" marL="457200" rtl="0" algn="l">
-              <a:spcBef>
-                <a:spcPts val="0"/>
-              </a:spcBef>
-              <a:spcAft>
-                <a:spcPts val="0"/>
-              </a:spcAft>
-              <a:buSzPts val="1800"/>
-              <a:buChar char="➔"/>
+            <a:pPr indent="0" lvl="0" marL="0" rtl="0" algn="l">
+              <a:spcBef>
+                <a:spcPts val="0"/>
+              </a:spcBef>
+              <a:spcAft>
+                <a:spcPts val="0"/>
+              </a:spcAft>
+              <a:buNone/>
             </a:pPr>
             <a:r>
               <a:rPr lang="en"/>
-              <a:t>POVERTY TRENDS</a:t>
+              <a:t>Datasets that Team 1 has explored are  </a:t>
+            </a:r>
+            <a:r>
+              <a:rPr b="1" lang="en"/>
+              <a:t>Age Trends, Crime dataset, Housing dataset,  Economic Well-being dataset,  Income dataset, Poverty dataset.</a:t>
+            </a:r>
+            <a:endParaRPr b="1"/>
+          </a:p>
+          <a:p>
+            <a:pPr indent="0" lvl="0" marL="0" rtl="0" algn="l">
+              <a:spcBef>
+                <a:spcPts val="1200"/>
+              </a:spcBef>
+              <a:spcAft>
+                <a:spcPts val="0"/>
+              </a:spcAft>
+              <a:buNone/>
+            </a:pPr>
+            <a:r>
+              <a:rPr b="1" lang="en"/>
+              <a:t>We have tried to present and plot as many variables as possible to understand the story of South-west DC better.</a:t>
+            </a:r>
+            <a:endParaRPr b="1"/>
+          </a:p>
+          <a:p>
+            <a:pPr indent="0" lvl="0" marL="0" rtl="0" algn="l">
+              <a:spcBef>
+                <a:spcPts val="1200"/>
+              </a:spcBef>
+              <a:spcAft>
+                <a:spcPts val="0"/>
+              </a:spcAft>
+              <a:buNone/>
+            </a:pPr>
+            <a:r>
+              <a:rPr lang="en"/>
+              <a:t>Some correlations we have found:</a:t>
             </a:r>
             <a:endParaRPr/>
           </a:p>
           <a:p>
-            <a:pPr indent="-342900" lvl="0" marL="457200" rtl="0" algn="l">
-              <a:spcBef>
-                <a:spcPts val="0"/>
-              </a:spcBef>
-              <a:spcAft>
-                <a:spcPts val="0"/>
-              </a:spcAft>
-              <a:buSzPts val="1800"/>
-              <a:buChar char="➔"/>
+            <a:pPr indent="-317182" lvl="0" marL="457200" rtl="0" algn="l">
+              <a:spcBef>
+                <a:spcPts val="1200"/>
+              </a:spcBef>
+              <a:spcAft>
+                <a:spcPts val="0"/>
+              </a:spcAft>
+              <a:buSzPct val="100000"/>
+              <a:buChar char="-"/>
             </a:pPr>
             <a:r>
               <a:rPr lang="en"/>
-              <a:t>CRIME TRENDS</a:t>
+              <a:t>Affordable</a:t>
+            </a:r>
+            <a:r>
+              <a:rPr lang="en"/>
+              <a:t> housing and gun related crime</a:t>
             </a:r>
             <a:endParaRPr/>
           </a:p>
           <a:p>
-            <a:pPr indent="0" lvl="0" marL="0" rtl="0" algn="l">
-              <a:spcBef>
-                <a:spcPts val="1200"/>
-              </a:spcBef>
-              <a:spcAft>
-                <a:spcPts val="0"/>
-              </a:spcAft>
-              <a:buNone/>
+            <a:pPr indent="-317182" lvl="0" marL="457200" rtl="0" algn="l">
+              <a:spcBef>
+                <a:spcPts val="0"/>
+              </a:spcBef>
+              <a:spcAft>
+                <a:spcPts val="0"/>
+              </a:spcAft>
+              <a:buSzPct val="100000"/>
+              <a:buChar char="-"/>
             </a:pPr>
             <a:r>
-              <a:t/>
+              <a:rPr lang="en"/>
+              <a:t>Income and Ward location</a:t>
             </a:r>
             <a:endParaRPr/>
           </a:p>
           <a:p>
-            <a:pPr indent="0" lvl="0" marL="0" rtl="0" algn="l">
-              <a:spcBef>
-                <a:spcPts val="1200"/>
-              </a:spcBef>
-              <a:spcAft>
-                <a:spcPts val="0"/>
-              </a:spcAft>
-              <a:buNone/>
+            <a:pPr indent="-317182" lvl="0" marL="457200" rtl="0" algn="l">
+              <a:spcBef>
+                <a:spcPts val="0"/>
+              </a:spcBef>
+              <a:spcAft>
+                <a:spcPts val="0"/>
+              </a:spcAft>
+              <a:buSzPct val="100000"/>
+              <a:buChar char="-"/>
             </a:pPr>
             <a:r>
-              <a:t/>
+              <a:rPr lang="en"/>
+              <a:t>Crime and Ward location</a:t>
             </a:r>
             <a:endParaRPr/>
           </a:p>
           <a:p>
-            <a:pPr indent="0" lvl="0" marL="0" rtl="0" algn="l">
-              <a:spcBef>
-                <a:spcPts val="1200"/>
-              </a:spcBef>
-              <a:spcAft>
-                <a:spcPts val="1200"/>
-              </a:spcAft>
-              <a:buNone/>
+            <a:pPr indent="-317182" lvl="0" marL="457200" rtl="0" algn="l">
+              <a:spcBef>
+                <a:spcPts val="0"/>
+              </a:spcBef>
+              <a:spcAft>
+                <a:spcPts val="0"/>
+              </a:spcAft>
+              <a:buSzPct val="100000"/>
+              <a:buChar char="-"/>
             </a:pPr>
             <a:r>
-              <a:t/>
+              <a:rPr lang="en"/>
+              <a:t>Median Income across Washington DC</a:t>
+            </a:r>
+            <a:endParaRPr/>
+          </a:p>
+          <a:p>
+            <a:pPr indent="-317182" lvl="0" marL="457200" rtl="0" algn="l">
+              <a:spcBef>
+                <a:spcPts val="0"/>
+              </a:spcBef>
+              <a:spcAft>
+                <a:spcPts val="0"/>
+              </a:spcAft>
+              <a:buSzPct val="100000"/>
+              <a:buChar char="-"/>
+            </a:pPr>
+            <a:r>
+              <a:rPr lang="en"/>
+              <a:t>Income amongst different ethnic groups </a:t>
+            </a:r>
+            <a:endParaRPr/>
+          </a:p>
+          <a:p>
+            <a:pPr indent="-317182" lvl="0" marL="457200" rtl="0" algn="l">
+              <a:spcBef>
+                <a:spcPts val="0"/>
+              </a:spcBef>
+              <a:spcAft>
+                <a:spcPts val="0"/>
+              </a:spcAft>
+              <a:buSzPct val="100000"/>
+              <a:buChar char="-"/>
+            </a:pPr>
+            <a:r>
+              <a:rPr lang="en"/>
+              <a:t>Poverty against various races</a:t>
+            </a:r>
+            <a:endParaRPr/>
+          </a:p>
+          <a:p>
+            <a:pPr indent="-317182" lvl="0" marL="457200" rtl="0" algn="l">
+              <a:spcBef>
+                <a:spcPts val="0"/>
+              </a:spcBef>
+              <a:spcAft>
+                <a:spcPts val="0"/>
+              </a:spcAft>
+              <a:buSzPct val="100000"/>
+              <a:buChar char="-"/>
+            </a:pPr>
+            <a:r>
+              <a:rPr lang="en"/>
+              <a:t>Kinds of Crime in different wards. </a:t>
             </a:r>
             <a:endParaRPr/>
           </a:p>

</xml_diff>